<commit_message>
Add new slides to presentation
</commit_message>
<xml_diff>
--- a/Паттерн MVC.pptx
+++ b/Паттерн MVC.pptx
@@ -18,6 +18,8 @@
     <p:sldId id="263" r:id="rId12"/>
     <p:sldId id="264" r:id="rId13"/>
     <p:sldId id="265" r:id="rId14"/>
+    <p:sldId id="267" r:id="rId15"/>
+    <p:sldId id="268" r:id="rId16"/>
   </p:sldIdLst>
   <p:sldSz cx="12192000" cy="6858000"/>
   <p:notesSz cx="6858000" cy="9144000"/>
@@ -220,173 +222,6 @@
 </file>
 
 <file path=ppt/slideLayouts/slideLayout10.xml><?xml version="1.0" encoding="utf-8"?>
-<p:sldLayout xmlns:a="http://schemas.openxmlformats.org/drawingml/2006/main" xmlns:r="http://schemas.openxmlformats.org/officeDocument/2006/relationships" xmlns:p="http://schemas.openxmlformats.org/presentationml/2006/main" type="twoObj" preserve="1">
-  <p:cSld name="Два объекта">
-    <p:spTree>
-      <p:nvGrpSpPr>
-        <p:cNvPr id="1" name=""/>
-        <p:cNvGrpSpPr/>
-        <p:nvPr/>
-      </p:nvGrpSpPr>
-      <p:grpSpPr>
-        <a:xfrm>
-          <a:off x="0" y="0"/>
-          <a:ext cx="0" cy="0"/>
-          <a:chOff x="0" y="0"/>
-          <a:chExt cx="0" cy="0"/>
-        </a:xfrm>
-      </p:grpSpPr>
-      <p:sp>
-        <p:nvSpPr>
-          <p:cNvPr id="2" name="Заголовок 1"/>
-          <p:cNvSpPr>
-            <a:spLocks noGrp="1"/>
-          </p:cNvSpPr>
-          <p:nvPr>
-            <p:ph type="title"/>
-          </p:nvPr>
-        </p:nvSpPr>
-        <p:spPr/>
-        <p:txBody>
-          <a:bodyPr/>
-          <a:lstStyle/>
-          <a:p>
-            <a:r>
-              <a:rPr lang="en-US"/>
-              <a:t>Click to edit Master title style</a:t>
-            </a:r>
-            <a:endParaRPr lang="ru-RU"/>
-          </a:p>
-        </p:txBody>
-      </p:sp>
-      <p:sp>
-        <p:nvSpPr>
-          <p:cNvPr id="3" name="Объект 2"/>
-          <p:cNvSpPr>
-            <a:spLocks noGrp="1"/>
-          </p:cNvSpPr>
-          <p:nvPr>
-            <p:ph sz="half" idx="1"/>
-          </p:nvPr>
-        </p:nvSpPr>
-        <p:spPr>
-          <a:xfrm>
-            <a:off x="609600" y="1604964"/>
-            <a:ext cx="5384800" cy="3976687"/>
-          </a:xfrm>
-        </p:spPr>
-        <p:txBody>
-          <a:bodyPr/>
-          <a:lstStyle/>
-          <a:p>
-            <a:pPr lvl="0"/>
-            <a:r>
-              <a:rPr lang="en-US"/>
-              <a:t>Edit Master text styles</a:t>
-            </a:r>
-          </a:p>
-          <a:p>
-            <a:pPr lvl="1"/>
-            <a:r>
-              <a:rPr lang="en-US"/>
-              <a:t>Second level</a:t>
-            </a:r>
-          </a:p>
-          <a:p>
-            <a:pPr lvl="2"/>
-            <a:r>
-              <a:rPr lang="en-US"/>
-              <a:t>Third level</a:t>
-            </a:r>
-          </a:p>
-          <a:p>
-            <a:pPr lvl="3"/>
-            <a:r>
-              <a:rPr lang="en-US"/>
-              <a:t>Fourth level</a:t>
-            </a:r>
-          </a:p>
-          <a:p>
-            <a:pPr lvl="4"/>
-            <a:r>
-              <a:rPr lang="en-US"/>
-              <a:t>Fifth level</a:t>
-            </a:r>
-            <a:endParaRPr lang="ru-RU"/>
-          </a:p>
-        </p:txBody>
-      </p:sp>
-      <p:sp>
-        <p:nvSpPr>
-          <p:cNvPr id="4" name="Объект 3"/>
-          <p:cNvSpPr>
-            <a:spLocks noGrp="1"/>
-          </p:cNvSpPr>
-          <p:nvPr>
-            <p:ph sz="half" idx="2"/>
-          </p:nvPr>
-        </p:nvSpPr>
-        <p:spPr>
-          <a:xfrm>
-            <a:off x="6197600" y="1604964"/>
-            <a:ext cx="5384800" cy="3976687"/>
-          </a:xfrm>
-        </p:spPr>
-        <p:txBody>
-          <a:bodyPr/>
-          <a:lstStyle/>
-          <a:p>
-            <a:pPr lvl="0"/>
-            <a:r>
-              <a:rPr lang="en-US"/>
-              <a:t>Edit Master text styles</a:t>
-            </a:r>
-          </a:p>
-          <a:p>
-            <a:pPr lvl="1"/>
-            <a:r>
-              <a:rPr lang="en-US"/>
-              <a:t>Second level</a:t>
-            </a:r>
-          </a:p>
-          <a:p>
-            <a:pPr lvl="2"/>
-            <a:r>
-              <a:rPr lang="en-US"/>
-              <a:t>Third level</a:t>
-            </a:r>
-          </a:p>
-          <a:p>
-            <a:pPr lvl="3"/>
-            <a:r>
-              <a:rPr lang="en-US"/>
-              <a:t>Fourth level</a:t>
-            </a:r>
-          </a:p>
-          <a:p>
-            <a:pPr lvl="4"/>
-            <a:r>
-              <a:rPr lang="en-US"/>
-              <a:t>Fifth level</a:t>
-            </a:r>
-            <a:endParaRPr lang="ru-RU"/>
-          </a:p>
-        </p:txBody>
-      </p:sp>
-    </p:spTree>
-    <p:extLst>
-      <p:ext uri="{BB962C8B-B14F-4D97-AF65-F5344CB8AC3E}">
-        <p14:creationId xmlns:p14="http://schemas.microsoft.com/office/powerpoint/2010/main" val="13129778"/>
-      </p:ext>
-    </p:extLst>
-  </p:cSld>
-  <p:clrMapOvr>
-    <a:masterClrMapping/>
-  </p:clrMapOvr>
-</p:sldLayout>
-</file>
-
-<file path=ppt/slideLayouts/slideLayout11.xml><?xml version="1.0" encoding="utf-8"?>
 <p:sldLayout xmlns:a="http://schemas.openxmlformats.org/drawingml/2006/main" xmlns:r="http://schemas.openxmlformats.org/officeDocument/2006/relationships" xmlns:p="http://schemas.openxmlformats.org/presentationml/2006/main" preserve="1">
   <p:cSld name="Сравнение">
     <p:spTree>
@@ -709,7 +544,7 @@
 </p:sldLayout>
 </file>
 
-<file path=ppt/slideLayouts/slideLayout12.xml><?xml version="1.0" encoding="utf-8"?>
+<file path=ppt/slideLayouts/slideLayout11.xml><?xml version="1.0" encoding="utf-8"?>
 <p:sldLayout xmlns:a="http://schemas.openxmlformats.org/drawingml/2006/main" xmlns:r="http://schemas.openxmlformats.org/officeDocument/2006/relationships" xmlns:p="http://schemas.openxmlformats.org/presentationml/2006/main" preserve="1">
   <p:cSld name="Только заголовок">
     <p:spTree>
@@ -788,7 +623,7 @@
 </p:sldLayout>
 </file>
 
-<file path=ppt/slideLayouts/slideLayout13.xml><?xml version="1.0" encoding="utf-8"?>
+<file path=ppt/slideLayouts/slideLayout12.xml><?xml version="1.0" encoding="utf-8"?>
 <p:sldLayout xmlns:a="http://schemas.openxmlformats.org/drawingml/2006/main" xmlns:r="http://schemas.openxmlformats.org/officeDocument/2006/relationships" xmlns:p="http://schemas.openxmlformats.org/presentationml/2006/main" type="blank" preserve="1">
   <p:cSld name="Пустой слайд">
     <p:spTree>
@@ -818,7 +653,7 @@
 </p:sldLayout>
 </file>
 
-<file path=ppt/slideLayouts/slideLayout14.xml><?xml version="1.0" encoding="utf-8"?>
+<file path=ppt/slideLayouts/slideLayout13.xml><?xml version="1.0" encoding="utf-8"?>
 <p:sldLayout xmlns:a="http://schemas.openxmlformats.org/drawingml/2006/main" xmlns:r="http://schemas.openxmlformats.org/officeDocument/2006/relationships" xmlns:p="http://schemas.openxmlformats.org/presentationml/2006/main" type="objTx" preserve="1">
   <p:cSld name="Объект с подписью">
     <p:spTree>
@@ -1030,7 +865,7 @@
 </p:sldLayout>
 </file>
 
-<file path=ppt/slideLayouts/slideLayout15.xml><?xml version="1.0" encoding="utf-8"?>
+<file path=ppt/slideLayouts/slideLayout14.xml><?xml version="1.0" encoding="utf-8"?>
 <p:sldLayout xmlns:a="http://schemas.openxmlformats.org/drawingml/2006/main" xmlns:r="http://schemas.openxmlformats.org/officeDocument/2006/relationships" xmlns:p="http://schemas.openxmlformats.org/presentationml/2006/main" preserve="1">
   <p:cSld name="Заголовок и вертикальный текст">
     <p:spTree>
@@ -1161,7 +996,7 @@
 </p:sldLayout>
 </file>
 
-<file path=ppt/slideLayouts/slideLayout16.xml><?xml version="1.0" encoding="utf-8"?>
+<file path=ppt/slideLayouts/slideLayout15.xml><?xml version="1.0" encoding="utf-8"?>
 <p:sldLayout xmlns:a="http://schemas.openxmlformats.org/drawingml/2006/main" xmlns:r="http://schemas.openxmlformats.org/officeDocument/2006/relationships" xmlns:p="http://schemas.openxmlformats.org/presentationml/2006/main" preserve="1">
   <p:cSld name="Пользовательский макет">
     <p:spTree>
@@ -1240,7 +1075,7 @@
 </p:sldLayout>
 </file>
 
-<file path=ppt/slideLayouts/slideLayout17.xml><?xml version="1.0" encoding="utf-8"?>
+<file path=ppt/slideLayouts/slideLayout16.xml><?xml version="1.0" encoding="utf-8"?>
 <p:sldLayout xmlns:a="http://schemas.openxmlformats.org/drawingml/2006/main" xmlns:r="http://schemas.openxmlformats.org/officeDocument/2006/relationships" xmlns:p="http://schemas.openxmlformats.org/presentationml/2006/main" type="titleOnly">
   <p:cSld name="Title Only">
     <p:spTree>
@@ -1381,7 +1216,7 @@
 </p:sldLayout>
 </file>
 
-<file path=ppt/slideLayouts/slideLayout18.xml><?xml version="1.0" encoding="utf-8"?>
+<file path=ppt/slideLayouts/slideLayout17.xml><?xml version="1.0" encoding="utf-8"?>
 <p:sldLayout xmlns:a="http://schemas.openxmlformats.org/drawingml/2006/main" xmlns:r="http://schemas.openxmlformats.org/officeDocument/2006/relationships" xmlns:p="http://schemas.openxmlformats.org/presentationml/2006/main" type="obj">
   <p:cSld name="Title and Content">
     <p:spTree>
@@ -1579,7 +1414,7 @@
 </p:sldLayout>
 </file>
 
-<file path=ppt/slideLayouts/slideLayout19.xml><?xml version="1.0" encoding="utf-8"?>
+<file path=ppt/slideLayouts/slideLayout18.xml><?xml version="1.0" encoding="utf-8"?>
 <p:sldLayout xmlns:a="http://schemas.openxmlformats.org/drawingml/2006/main" xmlns:r="http://schemas.openxmlformats.org/officeDocument/2006/relationships" xmlns:p="http://schemas.openxmlformats.org/presentationml/2006/main" type="title" preserve="1">
   <p:cSld name="Титульный слайд">
     <p:spTree>
@@ -1762,6 +1597,176 @@
     <p:extLst>
       <p:ext uri="{BB962C8B-B14F-4D97-AF65-F5344CB8AC3E}">
         <p14:creationId xmlns:p14="http://schemas.microsoft.com/office/powerpoint/2010/main" val="2927602947"/>
+      </p:ext>
+    </p:extLst>
+  </p:cSld>
+  <p:clrMapOvr>
+    <a:masterClrMapping/>
+  </p:clrMapOvr>
+</p:sldLayout>
+</file>
+
+<file path=ppt/slideLayouts/slideLayout19.xml><?xml version="1.0" encoding="utf-8"?>
+<p:sldLayout xmlns:a="http://schemas.openxmlformats.org/drawingml/2006/main" xmlns:r="http://schemas.openxmlformats.org/officeDocument/2006/relationships" xmlns:p="http://schemas.openxmlformats.org/presentationml/2006/main" type="obj" preserve="1">
+  <p:cSld name="Заголовок и объект">
+    <p:spTree>
+      <p:nvGrpSpPr>
+        <p:cNvPr id="1" name=""/>
+        <p:cNvGrpSpPr/>
+        <p:nvPr/>
+      </p:nvGrpSpPr>
+      <p:grpSpPr>
+        <a:xfrm>
+          <a:off x="0" y="0"/>
+          <a:ext cx="0" cy="0"/>
+          <a:chOff x="0" y="0"/>
+          <a:chExt cx="0" cy="0"/>
+        </a:xfrm>
+      </p:grpSpPr>
+      <p:sp>
+        <p:nvSpPr>
+          <p:cNvPr id="2" name="Title 1"/>
+          <p:cNvSpPr>
+            <a:spLocks noGrp="1"/>
+          </p:cNvSpPr>
+          <p:nvPr>
+            <p:ph type="title"/>
+          </p:nvPr>
+        </p:nvSpPr>
+        <p:spPr/>
+        <p:txBody>
+          <a:bodyPr/>
+          <a:lstStyle/>
+          <a:p>
+            <a:r>
+              <a:rPr lang="en-US"/>
+              <a:t>Click to edit Master title style</a:t>
+            </a:r>
+            <a:endParaRPr lang="en-US" dirty="0"/>
+          </a:p>
+        </p:txBody>
+      </p:sp>
+      <p:sp>
+        <p:nvSpPr>
+          <p:cNvPr id="3" name="Content Placeholder 2"/>
+          <p:cNvSpPr>
+            <a:spLocks noGrp="1"/>
+          </p:cNvSpPr>
+          <p:nvPr>
+            <p:ph idx="1"/>
+          </p:nvPr>
+        </p:nvSpPr>
+        <p:spPr/>
+        <p:txBody>
+          <a:bodyPr/>
+          <a:lstStyle/>
+          <a:p>
+            <a:pPr lvl="0"/>
+            <a:r>
+              <a:rPr lang="en-US"/>
+              <a:t>Edit Master text styles</a:t>
+            </a:r>
+          </a:p>
+          <a:p>
+            <a:pPr lvl="1"/>
+            <a:r>
+              <a:rPr lang="en-US"/>
+              <a:t>Second level</a:t>
+            </a:r>
+          </a:p>
+          <a:p>
+            <a:pPr lvl="2"/>
+            <a:r>
+              <a:rPr lang="en-US"/>
+              <a:t>Third level</a:t>
+            </a:r>
+          </a:p>
+          <a:p>
+            <a:pPr lvl="3"/>
+            <a:r>
+              <a:rPr lang="en-US"/>
+              <a:t>Fourth level</a:t>
+            </a:r>
+          </a:p>
+          <a:p>
+            <a:pPr lvl="4"/>
+            <a:r>
+              <a:rPr lang="en-US"/>
+              <a:t>Fifth level</a:t>
+            </a:r>
+            <a:endParaRPr lang="en-US" dirty="0"/>
+          </a:p>
+        </p:txBody>
+      </p:sp>
+      <p:sp>
+        <p:nvSpPr>
+          <p:cNvPr id="4" name="Date Placeholder 3"/>
+          <p:cNvSpPr>
+            <a:spLocks noGrp="1"/>
+          </p:cNvSpPr>
+          <p:nvPr>
+            <p:ph type="dt" sz="half" idx="10"/>
+          </p:nvPr>
+        </p:nvSpPr>
+        <p:spPr/>
+        <p:txBody>
+          <a:bodyPr/>
+          <a:lstStyle/>
+          <a:p>
+            <a:fld id="{C764DE79-268F-4C1A-8933-263129D2AF90}" type="datetimeFigureOut">
+              <a:rPr lang="en-US" dirty="0"/>
+              <a:t>3/22/2018</a:t>
+            </a:fld>
+            <a:endParaRPr lang="en-US" dirty="0"/>
+          </a:p>
+        </p:txBody>
+      </p:sp>
+      <p:sp>
+        <p:nvSpPr>
+          <p:cNvPr id="5" name="Footer Placeholder 4"/>
+          <p:cNvSpPr>
+            <a:spLocks noGrp="1"/>
+          </p:cNvSpPr>
+          <p:nvPr>
+            <p:ph type="ftr" sz="quarter" idx="11"/>
+          </p:nvPr>
+        </p:nvSpPr>
+        <p:spPr/>
+        <p:txBody>
+          <a:bodyPr/>
+          <a:lstStyle/>
+          <a:p>
+            <a:endParaRPr lang="en-US" dirty="0"/>
+          </a:p>
+        </p:txBody>
+      </p:sp>
+      <p:sp>
+        <p:nvSpPr>
+          <p:cNvPr id="6" name="Slide Number Placeholder 5"/>
+          <p:cNvSpPr>
+            <a:spLocks noGrp="1"/>
+          </p:cNvSpPr>
+          <p:nvPr>
+            <p:ph type="sldNum" sz="quarter" idx="12"/>
+          </p:nvPr>
+        </p:nvSpPr>
+        <p:spPr/>
+        <p:txBody>
+          <a:bodyPr/>
+          <a:lstStyle/>
+          <a:p>
+            <a:fld id="{48F63A3B-78C7-47BE-AE5E-E10140E04643}" type="slidenum">
+              <a:rPr lang="en-US" dirty="0"/>
+              <a:t>‹#›</a:t>
+            </a:fld>
+            <a:endParaRPr lang="en-US" dirty="0"/>
+          </a:p>
+        </p:txBody>
+      </p:sp>
+    </p:spTree>
+    <p:extLst>
+      <p:ext uri="{BB962C8B-B14F-4D97-AF65-F5344CB8AC3E}">
+        <p14:creationId xmlns:p14="http://schemas.microsoft.com/office/powerpoint/2010/main" val="743774606"/>
       </p:ext>
     </p:extLst>
   </p:cSld>
@@ -1992,176 +1997,6 @@
 </file>
 
 <file path=ppt/slideLayouts/slideLayout20.xml><?xml version="1.0" encoding="utf-8"?>
-<p:sldLayout xmlns:a="http://schemas.openxmlformats.org/drawingml/2006/main" xmlns:r="http://schemas.openxmlformats.org/officeDocument/2006/relationships" xmlns:p="http://schemas.openxmlformats.org/presentationml/2006/main" type="obj" preserve="1">
-  <p:cSld name="Заголовок и объект">
-    <p:spTree>
-      <p:nvGrpSpPr>
-        <p:cNvPr id="1" name=""/>
-        <p:cNvGrpSpPr/>
-        <p:nvPr/>
-      </p:nvGrpSpPr>
-      <p:grpSpPr>
-        <a:xfrm>
-          <a:off x="0" y="0"/>
-          <a:ext cx="0" cy="0"/>
-          <a:chOff x="0" y="0"/>
-          <a:chExt cx="0" cy="0"/>
-        </a:xfrm>
-      </p:grpSpPr>
-      <p:sp>
-        <p:nvSpPr>
-          <p:cNvPr id="2" name="Title 1"/>
-          <p:cNvSpPr>
-            <a:spLocks noGrp="1"/>
-          </p:cNvSpPr>
-          <p:nvPr>
-            <p:ph type="title"/>
-          </p:nvPr>
-        </p:nvSpPr>
-        <p:spPr/>
-        <p:txBody>
-          <a:bodyPr/>
-          <a:lstStyle/>
-          <a:p>
-            <a:r>
-              <a:rPr lang="en-US"/>
-              <a:t>Click to edit Master title style</a:t>
-            </a:r>
-            <a:endParaRPr lang="en-US" dirty="0"/>
-          </a:p>
-        </p:txBody>
-      </p:sp>
-      <p:sp>
-        <p:nvSpPr>
-          <p:cNvPr id="3" name="Content Placeholder 2"/>
-          <p:cNvSpPr>
-            <a:spLocks noGrp="1"/>
-          </p:cNvSpPr>
-          <p:nvPr>
-            <p:ph idx="1"/>
-          </p:nvPr>
-        </p:nvSpPr>
-        <p:spPr/>
-        <p:txBody>
-          <a:bodyPr/>
-          <a:lstStyle/>
-          <a:p>
-            <a:pPr lvl="0"/>
-            <a:r>
-              <a:rPr lang="en-US"/>
-              <a:t>Edit Master text styles</a:t>
-            </a:r>
-          </a:p>
-          <a:p>
-            <a:pPr lvl="1"/>
-            <a:r>
-              <a:rPr lang="en-US"/>
-              <a:t>Second level</a:t>
-            </a:r>
-          </a:p>
-          <a:p>
-            <a:pPr lvl="2"/>
-            <a:r>
-              <a:rPr lang="en-US"/>
-              <a:t>Third level</a:t>
-            </a:r>
-          </a:p>
-          <a:p>
-            <a:pPr lvl="3"/>
-            <a:r>
-              <a:rPr lang="en-US"/>
-              <a:t>Fourth level</a:t>
-            </a:r>
-          </a:p>
-          <a:p>
-            <a:pPr lvl="4"/>
-            <a:r>
-              <a:rPr lang="en-US"/>
-              <a:t>Fifth level</a:t>
-            </a:r>
-            <a:endParaRPr lang="en-US" dirty="0"/>
-          </a:p>
-        </p:txBody>
-      </p:sp>
-      <p:sp>
-        <p:nvSpPr>
-          <p:cNvPr id="4" name="Date Placeholder 3"/>
-          <p:cNvSpPr>
-            <a:spLocks noGrp="1"/>
-          </p:cNvSpPr>
-          <p:nvPr>
-            <p:ph type="dt" sz="half" idx="10"/>
-          </p:nvPr>
-        </p:nvSpPr>
-        <p:spPr/>
-        <p:txBody>
-          <a:bodyPr/>
-          <a:lstStyle/>
-          <a:p>
-            <a:fld id="{C764DE79-268F-4C1A-8933-263129D2AF90}" type="datetimeFigureOut">
-              <a:rPr lang="en-US" dirty="0"/>
-              <a:t>3/22/2018</a:t>
-            </a:fld>
-            <a:endParaRPr lang="en-US" dirty="0"/>
-          </a:p>
-        </p:txBody>
-      </p:sp>
-      <p:sp>
-        <p:nvSpPr>
-          <p:cNvPr id="5" name="Footer Placeholder 4"/>
-          <p:cNvSpPr>
-            <a:spLocks noGrp="1"/>
-          </p:cNvSpPr>
-          <p:nvPr>
-            <p:ph type="ftr" sz="quarter" idx="11"/>
-          </p:nvPr>
-        </p:nvSpPr>
-        <p:spPr/>
-        <p:txBody>
-          <a:bodyPr/>
-          <a:lstStyle/>
-          <a:p>
-            <a:endParaRPr lang="en-US" dirty="0"/>
-          </a:p>
-        </p:txBody>
-      </p:sp>
-      <p:sp>
-        <p:nvSpPr>
-          <p:cNvPr id="6" name="Slide Number Placeholder 5"/>
-          <p:cNvSpPr>
-            <a:spLocks noGrp="1"/>
-          </p:cNvSpPr>
-          <p:nvPr>
-            <p:ph type="sldNum" sz="quarter" idx="12"/>
-          </p:nvPr>
-        </p:nvSpPr>
-        <p:spPr/>
-        <p:txBody>
-          <a:bodyPr/>
-          <a:lstStyle/>
-          <a:p>
-            <a:fld id="{48F63A3B-78C7-47BE-AE5E-E10140E04643}" type="slidenum">
-              <a:rPr lang="en-US" dirty="0"/>
-              <a:t>‹#›</a:t>
-            </a:fld>
-            <a:endParaRPr lang="en-US" dirty="0"/>
-          </a:p>
-        </p:txBody>
-      </p:sp>
-    </p:spTree>
-    <p:extLst>
-      <p:ext uri="{BB962C8B-B14F-4D97-AF65-F5344CB8AC3E}">
-        <p14:creationId xmlns:p14="http://schemas.microsoft.com/office/powerpoint/2010/main" val="743774606"/>
-      </p:ext>
-    </p:extLst>
-  </p:cSld>
-  <p:clrMapOvr>
-    <a:masterClrMapping/>
-  </p:clrMapOvr>
-</p:sldLayout>
-</file>
-
-<file path=ppt/slideLayouts/slideLayout21.xml><?xml version="1.0" encoding="utf-8"?>
 <p:sldLayout xmlns:a="http://schemas.openxmlformats.org/drawingml/2006/main" xmlns:r="http://schemas.openxmlformats.org/officeDocument/2006/relationships" xmlns:p="http://schemas.openxmlformats.org/presentationml/2006/main" type="secHead" preserve="1">
   <p:cSld name="Заголовок раздела">
     <p:spTree>
@@ -2407,7 +2242,7 @@
 </p:sldLayout>
 </file>
 
-<file path=ppt/slideLayouts/slideLayout22.xml><?xml version="1.0" encoding="utf-8"?>
+<file path=ppt/slideLayouts/slideLayout21.xml><?xml version="1.0" encoding="utf-8"?>
 <p:sldLayout xmlns:a="http://schemas.openxmlformats.org/drawingml/2006/main" xmlns:r="http://schemas.openxmlformats.org/officeDocument/2006/relationships" xmlns:p="http://schemas.openxmlformats.org/presentationml/2006/main" type="twoObj" preserve="1">
   <p:cSld name="Два объекта">
     <p:spTree>
@@ -2639,7 +2474,7 @@
 </p:sldLayout>
 </file>
 
-<file path=ppt/slideLayouts/slideLayout23.xml><?xml version="1.0" encoding="utf-8"?>
+<file path=ppt/slideLayouts/slideLayout22.xml><?xml version="1.0" encoding="utf-8"?>
 <p:sldLayout xmlns:a="http://schemas.openxmlformats.org/drawingml/2006/main" xmlns:r="http://schemas.openxmlformats.org/officeDocument/2006/relationships" xmlns:p="http://schemas.openxmlformats.org/presentationml/2006/main" type="twoTxTwoObj" preserve="1">
   <p:cSld name="Сравнение">
     <p:spTree>
@@ -3006,7 +2841,7 @@
 </p:sldLayout>
 </file>
 
-<file path=ppt/slideLayouts/slideLayout24.xml><?xml version="1.0" encoding="utf-8"?>
+<file path=ppt/slideLayouts/slideLayout23.xml><?xml version="1.0" encoding="utf-8"?>
 <p:sldLayout xmlns:a="http://schemas.openxmlformats.org/drawingml/2006/main" xmlns:r="http://schemas.openxmlformats.org/officeDocument/2006/relationships" xmlns:p="http://schemas.openxmlformats.org/presentationml/2006/main" type="titleOnly" preserve="1">
   <p:cSld name="Только заголовок">
     <p:spTree>
@@ -3124,7 +2959,7 @@
 </p:sldLayout>
 </file>
 
-<file path=ppt/slideLayouts/slideLayout25.xml><?xml version="1.0" encoding="utf-8"?>
+<file path=ppt/slideLayouts/slideLayout24.xml><?xml version="1.0" encoding="utf-8"?>
 <p:sldLayout xmlns:a="http://schemas.openxmlformats.org/drawingml/2006/main" xmlns:r="http://schemas.openxmlformats.org/officeDocument/2006/relationships" xmlns:p="http://schemas.openxmlformats.org/presentationml/2006/main" type="blank" preserve="1">
   <p:cSld name="Пустой слайд">
     <p:spTree>
@@ -3219,7 +3054,7 @@
 </p:sldLayout>
 </file>
 
-<file path=ppt/slideLayouts/slideLayout26.xml><?xml version="1.0" encoding="utf-8"?>
+<file path=ppt/slideLayouts/slideLayout25.xml><?xml version="1.0" encoding="utf-8"?>
 <p:sldLayout xmlns:a="http://schemas.openxmlformats.org/drawingml/2006/main" xmlns:r="http://schemas.openxmlformats.org/officeDocument/2006/relationships" xmlns:p="http://schemas.openxmlformats.org/presentationml/2006/main" type="objTx" preserve="1">
   <p:cSld name="Объект с подписью">
     <p:spTree>
@@ -3496,7 +3331,7 @@
 </p:sldLayout>
 </file>
 
-<file path=ppt/slideLayouts/slideLayout27.xml><?xml version="1.0" encoding="utf-8"?>
+<file path=ppt/slideLayouts/slideLayout26.xml><?xml version="1.0" encoding="utf-8"?>
 <p:sldLayout xmlns:a="http://schemas.openxmlformats.org/drawingml/2006/main" xmlns:r="http://schemas.openxmlformats.org/officeDocument/2006/relationships" xmlns:p="http://schemas.openxmlformats.org/presentationml/2006/main" type="picTx" preserve="1">
   <p:cSld name="Рисунок с подписью">
     <p:spTree>
@@ -3753,7 +3588,7 @@
 </p:sldLayout>
 </file>
 
-<file path=ppt/slideLayouts/slideLayout28.xml><?xml version="1.0" encoding="utf-8"?>
+<file path=ppt/slideLayouts/slideLayout27.xml><?xml version="1.0" encoding="utf-8"?>
 <p:sldLayout xmlns:a="http://schemas.openxmlformats.org/drawingml/2006/main" xmlns:r="http://schemas.openxmlformats.org/officeDocument/2006/relationships" xmlns:p="http://schemas.openxmlformats.org/presentationml/2006/main" type="vertTx" preserve="1">
   <p:cSld name="Заголовок и вертикальный текст">
     <p:spTree>
@@ -3923,7 +3758,7 @@
 </p:sldLayout>
 </file>
 
-<file path=ppt/slideLayouts/slideLayout29.xml><?xml version="1.0" encoding="utf-8"?>
+<file path=ppt/slideLayouts/slideLayout28.xml><?xml version="1.0" encoding="utf-8"?>
 <p:sldLayout xmlns:a="http://schemas.openxmlformats.org/drawingml/2006/main" xmlns:r="http://schemas.openxmlformats.org/officeDocument/2006/relationships" xmlns:p="http://schemas.openxmlformats.org/presentationml/2006/main" type="vertTitleAndTx" preserve="1">
   <p:cSld name="Вертикальный заголовок и текст">
     <p:spTree>
@@ -4094,6 +3929,64 @@
     <p:extLst>
       <p:ext uri="{BB962C8B-B14F-4D97-AF65-F5344CB8AC3E}">
         <p14:creationId xmlns:p14="http://schemas.microsoft.com/office/powerpoint/2010/main" val="3407003495"/>
+      </p:ext>
+    </p:extLst>
+  </p:cSld>
+  <p:clrMapOvr>
+    <a:masterClrMapping/>
+  </p:clrMapOvr>
+</p:sldLayout>
+</file>
+
+<file path=ppt/slideLayouts/slideLayout29.xml><?xml version="1.0" encoding="utf-8"?>
+<p:sldLayout xmlns:a="http://schemas.openxmlformats.org/drawingml/2006/main" xmlns:r="http://schemas.openxmlformats.org/officeDocument/2006/relationships" xmlns:p="http://schemas.openxmlformats.org/presentationml/2006/main" preserve="1">
+  <p:cSld name="Пользовательский макет">
+    <p:spTree>
+      <p:nvGrpSpPr>
+        <p:cNvPr id="1" name=""/>
+        <p:cNvGrpSpPr/>
+        <p:nvPr/>
+      </p:nvGrpSpPr>
+      <p:grpSpPr>
+        <a:xfrm>
+          <a:off x="0" y="0"/>
+          <a:ext cx="0" cy="0"/>
+          <a:chOff x="0" y="0"/>
+          <a:chExt cx="0" cy="0"/>
+        </a:xfrm>
+      </p:grpSpPr>
+      <p:sp>
+        <p:nvSpPr>
+          <p:cNvPr id="2" name="Заголовок 1"/>
+          <p:cNvSpPr>
+            <a:spLocks noGrp="1"/>
+          </p:cNvSpPr>
+          <p:nvPr>
+            <p:ph type="title"/>
+          </p:nvPr>
+        </p:nvSpPr>
+        <p:spPr>
+          <a:xfrm>
+            <a:off x="476251" y="273051"/>
+            <a:ext cx="10970683" cy="441325"/>
+          </a:xfrm>
+        </p:spPr>
+        <p:txBody>
+          <a:bodyPr/>
+          <a:lstStyle/>
+          <a:p>
+            <a:r>
+              <a:rPr lang="en-US"/>
+              <a:t>Click to edit Master title style</a:t>
+            </a:r>
+            <a:endParaRPr lang="ru-RU"/>
+          </a:p>
+        </p:txBody>
+      </p:sp>
+    </p:spTree>
+    <p:extLst>
+      <p:ext uri="{BB962C8B-B14F-4D97-AF65-F5344CB8AC3E}">
+        <p14:creationId xmlns:p14="http://schemas.microsoft.com/office/powerpoint/2010/main" val="2174905242"/>
       </p:ext>
     </p:extLst>
   </p:cSld>
@@ -4244,263 +4137,7 @@
 </p:sldLayout>
 </file>
 
-<file path=ppt/slideLayouts/slideLayout30.xml><?xml version="1.0" encoding="utf-8"?>
-<p:sldLayout xmlns:a="http://schemas.openxmlformats.org/drawingml/2006/main" xmlns:r="http://schemas.openxmlformats.org/officeDocument/2006/relationships" xmlns:p="http://schemas.openxmlformats.org/presentationml/2006/main" preserve="1">
-  <p:cSld name="Пользовательский макет">
-    <p:spTree>
-      <p:nvGrpSpPr>
-        <p:cNvPr id="1" name=""/>
-        <p:cNvGrpSpPr/>
-        <p:nvPr/>
-      </p:nvGrpSpPr>
-      <p:grpSpPr>
-        <a:xfrm>
-          <a:off x="0" y="0"/>
-          <a:ext cx="0" cy="0"/>
-          <a:chOff x="0" y="0"/>
-          <a:chExt cx="0" cy="0"/>
-        </a:xfrm>
-      </p:grpSpPr>
-      <p:sp>
-        <p:nvSpPr>
-          <p:cNvPr id="2" name="Заголовок 1"/>
-          <p:cNvSpPr>
-            <a:spLocks noGrp="1"/>
-          </p:cNvSpPr>
-          <p:nvPr>
-            <p:ph type="title"/>
-          </p:nvPr>
-        </p:nvSpPr>
-        <p:spPr>
-          <a:xfrm>
-            <a:off x="476251" y="273051"/>
-            <a:ext cx="10970683" cy="441325"/>
-          </a:xfrm>
-        </p:spPr>
-        <p:txBody>
-          <a:bodyPr/>
-          <a:lstStyle/>
-          <a:p>
-            <a:r>
-              <a:rPr lang="en-US"/>
-              <a:t>Click to edit Master title style</a:t>
-            </a:r>
-            <a:endParaRPr lang="ru-RU"/>
-          </a:p>
-        </p:txBody>
-      </p:sp>
-    </p:spTree>
-    <p:extLst>
-      <p:ext uri="{BB962C8B-B14F-4D97-AF65-F5344CB8AC3E}">
-        <p14:creationId xmlns:p14="http://schemas.microsoft.com/office/powerpoint/2010/main" val="2174905242"/>
-      </p:ext>
-    </p:extLst>
-  </p:cSld>
-  <p:clrMapOvr>
-    <a:masterClrMapping/>
-  </p:clrMapOvr>
-</p:sldLayout>
-</file>
-
 <file path=ppt/slideLayouts/slideLayout4.xml><?xml version="1.0" encoding="utf-8"?>
-<p:sldLayout xmlns:a="http://schemas.openxmlformats.org/drawingml/2006/main" xmlns:r="http://schemas.openxmlformats.org/officeDocument/2006/relationships" xmlns:p="http://schemas.openxmlformats.org/presentationml/2006/main" type="obj">
-  <p:cSld name="Title and Content">
-    <p:spTree>
-      <p:nvGrpSpPr>
-        <p:cNvPr id="1" name=""/>
-        <p:cNvGrpSpPr/>
-        <p:nvPr/>
-      </p:nvGrpSpPr>
-      <p:grpSpPr>
-        <a:xfrm>
-          <a:off x="0" y="0"/>
-          <a:ext cx="0" cy="0"/>
-          <a:chOff x="0" y="0"/>
-          <a:chExt cx="0" cy="0"/>
-        </a:xfrm>
-      </p:grpSpPr>
-      <p:sp>
-        <p:nvSpPr>
-          <p:cNvPr id="2" name="Title 1">
-            <a:extLst>
-              <a:ext uri="{FF2B5EF4-FFF2-40B4-BE49-F238E27FC236}">
-                <a16:creationId xmlns:a16="http://schemas.microsoft.com/office/drawing/2014/main" id="{90C4897E-5FB0-48E0-BDD9-0A83ABB76F06}"/>
-              </a:ext>
-            </a:extLst>
-          </p:cNvPr>
-          <p:cNvSpPr>
-            <a:spLocks noGrp="1"/>
-          </p:cNvSpPr>
-          <p:nvPr>
-            <p:ph type="title"/>
-          </p:nvPr>
-        </p:nvSpPr>
-        <p:spPr/>
-        <p:txBody>
-          <a:bodyPr/>
-          <a:lstStyle/>
-          <a:p>
-            <a:r>
-              <a:rPr lang="en-US"/>
-              <a:t>Click to edit Master title style</a:t>
-            </a:r>
-          </a:p>
-        </p:txBody>
-      </p:sp>
-      <p:sp>
-        <p:nvSpPr>
-          <p:cNvPr id="3" name="Content Placeholder 2">
-            <a:extLst>
-              <a:ext uri="{FF2B5EF4-FFF2-40B4-BE49-F238E27FC236}">
-                <a16:creationId xmlns:a16="http://schemas.microsoft.com/office/drawing/2014/main" id="{611C3A6C-4FC2-4A7D-86F1-9A63C9DFFEEF}"/>
-              </a:ext>
-            </a:extLst>
-          </p:cNvPr>
-          <p:cNvSpPr>
-            <a:spLocks noGrp="1"/>
-          </p:cNvSpPr>
-          <p:nvPr>
-            <p:ph idx="1"/>
-          </p:nvPr>
-        </p:nvSpPr>
-        <p:spPr/>
-        <p:txBody>
-          <a:bodyPr/>
-          <a:lstStyle/>
-          <a:p>
-            <a:pPr lvl="0"/>
-            <a:r>
-              <a:rPr lang="en-US"/>
-              <a:t>Edit Master text styles</a:t>
-            </a:r>
-          </a:p>
-          <a:p>
-            <a:pPr lvl="1"/>
-            <a:r>
-              <a:rPr lang="en-US"/>
-              <a:t>Second level</a:t>
-            </a:r>
-          </a:p>
-          <a:p>
-            <a:pPr lvl="2"/>
-            <a:r>
-              <a:rPr lang="en-US"/>
-              <a:t>Third level</a:t>
-            </a:r>
-          </a:p>
-          <a:p>
-            <a:pPr lvl="3"/>
-            <a:r>
-              <a:rPr lang="en-US"/>
-              <a:t>Fourth level</a:t>
-            </a:r>
-          </a:p>
-          <a:p>
-            <a:pPr lvl="4"/>
-            <a:r>
-              <a:rPr lang="en-US"/>
-              <a:t>Fifth level</a:t>
-            </a:r>
-          </a:p>
-        </p:txBody>
-      </p:sp>
-      <p:sp>
-        <p:nvSpPr>
-          <p:cNvPr id="4" name="Date Placeholder 3">
-            <a:extLst>
-              <a:ext uri="{FF2B5EF4-FFF2-40B4-BE49-F238E27FC236}">
-                <a16:creationId xmlns:a16="http://schemas.microsoft.com/office/drawing/2014/main" id="{694B90EB-3143-4939-B542-0E93367F8932}"/>
-              </a:ext>
-            </a:extLst>
-          </p:cNvPr>
-          <p:cNvSpPr>
-            <a:spLocks noGrp="1"/>
-          </p:cNvSpPr>
-          <p:nvPr>
-            <p:ph type="dt" sz="half" idx="10"/>
-          </p:nvPr>
-        </p:nvSpPr>
-        <p:spPr/>
-        <p:txBody>
-          <a:bodyPr/>
-          <a:lstStyle/>
-          <a:p>
-            <a:fld id="{98B268AD-4E81-4577-BD5E-7A237943881D}" type="datetimeFigureOut">
-              <a:rPr lang="en-US" smtClean="0"/>
-              <a:t>3/22/2018</a:t>
-            </a:fld>
-            <a:endParaRPr lang="en-US"/>
-          </a:p>
-        </p:txBody>
-      </p:sp>
-      <p:sp>
-        <p:nvSpPr>
-          <p:cNvPr id="5" name="Footer Placeholder 4">
-            <a:extLst>
-              <a:ext uri="{FF2B5EF4-FFF2-40B4-BE49-F238E27FC236}">
-                <a16:creationId xmlns:a16="http://schemas.microsoft.com/office/drawing/2014/main" id="{3F2CCF52-CE51-4A62-8AD2-DF4C8FB2C3F1}"/>
-              </a:ext>
-            </a:extLst>
-          </p:cNvPr>
-          <p:cNvSpPr>
-            <a:spLocks noGrp="1"/>
-          </p:cNvSpPr>
-          <p:nvPr>
-            <p:ph type="ftr" sz="quarter" idx="11"/>
-          </p:nvPr>
-        </p:nvSpPr>
-        <p:spPr/>
-        <p:txBody>
-          <a:bodyPr/>
-          <a:lstStyle/>
-          <a:p>
-            <a:endParaRPr lang="en-US"/>
-          </a:p>
-        </p:txBody>
-      </p:sp>
-      <p:sp>
-        <p:nvSpPr>
-          <p:cNvPr id="6" name="Slide Number Placeholder 5">
-            <a:extLst>
-              <a:ext uri="{FF2B5EF4-FFF2-40B4-BE49-F238E27FC236}">
-                <a16:creationId xmlns:a16="http://schemas.microsoft.com/office/drawing/2014/main" id="{1D236B55-C3F7-41A9-89F6-CC7988F2B46F}"/>
-              </a:ext>
-            </a:extLst>
-          </p:cNvPr>
-          <p:cNvSpPr>
-            <a:spLocks noGrp="1"/>
-          </p:cNvSpPr>
-          <p:nvPr>
-            <p:ph type="sldNum" sz="quarter" idx="12"/>
-          </p:nvPr>
-        </p:nvSpPr>
-        <p:spPr/>
-        <p:txBody>
-          <a:bodyPr/>
-          <a:lstStyle/>
-          <a:p>
-            <a:fld id="{8679A571-FCF2-4963-A9FF-B7695BB81D3D}" type="slidenum">
-              <a:rPr lang="en-US" smtClean="0"/>
-              <a:t>‹#›</a:t>
-            </a:fld>
-            <a:endParaRPr lang="en-US"/>
-          </a:p>
-        </p:txBody>
-      </p:sp>
-    </p:spTree>
-    <p:extLst>
-      <p:ext uri="{BB962C8B-B14F-4D97-AF65-F5344CB8AC3E}">
-        <p14:creationId xmlns:p14="http://schemas.microsoft.com/office/powerpoint/2010/main" val="3958347622"/>
-      </p:ext>
-    </p:extLst>
-  </p:cSld>
-  <p:clrMapOvr>
-    <a:masterClrMapping/>
-  </p:clrMapOvr>
-</p:sldLayout>
-</file>
-
-<file path=ppt/slideLayouts/slideLayout5.xml><?xml version="1.0" encoding="utf-8"?>
 <p:sldLayout xmlns:a="http://schemas.openxmlformats.org/drawingml/2006/main" xmlns:r="http://schemas.openxmlformats.org/officeDocument/2006/relationships" xmlns:p="http://schemas.openxmlformats.org/presentationml/2006/main">
   <p:cSld name="Только заголовок">
     <p:spTree>
@@ -4579,7 +4216,7 @@
 </p:sldLayout>
 </file>
 
-<file path=ppt/slideLayouts/slideLayout6.xml><?xml version="1.0" encoding="utf-8"?>
+<file path=ppt/slideLayouts/slideLayout5.xml><?xml version="1.0" encoding="utf-8"?>
 <p:sldLayout xmlns:a="http://schemas.openxmlformats.org/drawingml/2006/main" xmlns:r="http://schemas.openxmlformats.org/officeDocument/2006/relationships" xmlns:p="http://schemas.openxmlformats.org/presentationml/2006/main">
   <p:cSld name="Заголовок и объект">
     <p:spTree>
@@ -4710,7 +4347,7 @@
 </p:sldLayout>
 </file>
 
-<file path=ppt/slideLayouts/slideLayout7.xml><?xml version="1.0" encoding="utf-8"?>
+<file path=ppt/slideLayouts/slideLayout6.xml><?xml version="1.0" encoding="utf-8"?>
 <p:sldLayout xmlns:a="http://schemas.openxmlformats.org/drawingml/2006/main" xmlns:r="http://schemas.openxmlformats.org/officeDocument/2006/relationships" xmlns:p="http://schemas.openxmlformats.org/presentationml/2006/main" type="title" preserve="1">
   <p:cSld name="Титульный слайд">
     <p:spTree>
@@ -5014,7 +4651,7 @@
 </p:sldLayout>
 </file>
 
-<file path=ppt/slideLayouts/slideLayout8.xml><?xml version="1.0" encoding="utf-8"?>
+<file path=ppt/slideLayouts/slideLayout7.xml><?xml version="1.0" encoding="utf-8"?>
 <p:sldLayout xmlns:a="http://schemas.openxmlformats.org/drawingml/2006/main" xmlns:r="http://schemas.openxmlformats.org/officeDocument/2006/relationships" xmlns:p="http://schemas.openxmlformats.org/presentationml/2006/main" preserve="1">
   <p:cSld name="Заголовок и объект">
     <p:spTree>
@@ -5145,7 +4782,7 @@
 </p:sldLayout>
 </file>
 
-<file path=ppt/slideLayouts/slideLayout9.xml><?xml version="1.0" encoding="utf-8"?>
+<file path=ppt/slideLayouts/slideLayout8.xml><?xml version="1.0" encoding="utf-8"?>
 <p:sldLayout xmlns:a="http://schemas.openxmlformats.org/drawingml/2006/main" xmlns:r="http://schemas.openxmlformats.org/officeDocument/2006/relationships" xmlns:p="http://schemas.openxmlformats.org/presentationml/2006/main" type="secHead" preserve="1">
   <p:cSld name="Заголовок раздела">
     <p:spTree>
@@ -5263,6 +4900,173 @@
     <p:extLst>
       <p:ext uri="{BB962C8B-B14F-4D97-AF65-F5344CB8AC3E}">
         <p14:creationId xmlns:p14="http://schemas.microsoft.com/office/powerpoint/2010/main" val="890604891"/>
+      </p:ext>
+    </p:extLst>
+  </p:cSld>
+  <p:clrMapOvr>
+    <a:masterClrMapping/>
+  </p:clrMapOvr>
+</p:sldLayout>
+</file>
+
+<file path=ppt/slideLayouts/slideLayout9.xml><?xml version="1.0" encoding="utf-8"?>
+<p:sldLayout xmlns:a="http://schemas.openxmlformats.org/drawingml/2006/main" xmlns:r="http://schemas.openxmlformats.org/officeDocument/2006/relationships" xmlns:p="http://schemas.openxmlformats.org/presentationml/2006/main" type="twoObj" preserve="1">
+  <p:cSld name="Два объекта">
+    <p:spTree>
+      <p:nvGrpSpPr>
+        <p:cNvPr id="1" name=""/>
+        <p:cNvGrpSpPr/>
+        <p:nvPr/>
+      </p:nvGrpSpPr>
+      <p:grpSpPr>
+        <a:xfrm>
+          <a:off x="0" y="0"/>
+          <a:ext cx="0" cy="0"/>
+          <a:chOff x="0" y="0"/>
+          <a:chExt cx="0" cy="0"/>
+        </a:xfrm>
+      </p:grpSpPr>
+      <p:sp>
+        <p:nvSpPr>
+          <p:cNvPr id="2" name="Заголовок 1"/>
+          <p:cNvSpPr>
+            <a:spLocks noGrp="1"/>
+          </p:cNvSpPr>
+          <p:nvPr>
+            <p:ph type="title"/>
+          </p:nvPr>
+        </p:nvSpPr>
+        <p:spPr/>
+        <p:txBody>
+          <a:bodyPr/>
+          <a:lstStyle/>
+          <a:p>
+            <a:r>
+              <a:rPr lang="en-US"/>
+              <a:t>Click to edit Master title style</a:t>
+            </a:r>
+            <a:endParaRPr lang="ru-RU"/>
+          </a:p>
+        </p:txBody>
+      </p:sp>
+      <p:sp>
+        <p:nvSpPr>
+          <p:cNvPr id="3" name="Объект 2"/>
+          <p:cNvSpPr>
+            <a:spLocks noGrp="1"/>
+          </p:cNvSpPr>
+          <p:nvPr>
+            <p:ph sz="half" idx="1"/>
+          </p:nvPr>
+        </p:nvSpPr>
+        <p:spPr>
+          <a:xfrm>
+            <a:off x="609600" y="1604964"/>
+            <a:ext cx="5384800" cy="3976687"/>
+          </a:xfrm>
+        </p:spPr>
+        <p:txBody>
+          <a:bodyPr/>
+          <a:lstStyle/>
+          <a:p>
+            <a:pPr lvl="0"/>
+            <a:r>
+              <a:rPr lang="en-US"/>
+              <a:t>Edit Master text styles</a:t>
+            </a:r>
+          </a:p>
+          <a:p>
+            <a:pPr lvl="1"/>
+            <a:r>
+              <a:rPr lang="en-US"/>
+              <a:t>Second level</a:t>
+            </a:r>
+          </a:p>
+          <a:p>
+            <a:pPr lvl="2"/>
+            <a:r>
+              <a:rPr lang="en-US"/>
+              <a:t>Third level</a:t>
+            </a:r>
+          </a:p>
+          <a:p>
+            <a:pPr lvl="3"/>
+            <a:r>
+              <a:rPr lang="en-US"/>
+              <a:t>Fourth level</a:t>
+            </a:r>
+          </a:p>
+          <a:p>
+            <a:pPr lvl="4"/>
+            <a:r>
+              <a:rPr lang="en-US"/>
+              <a:t>Fifth level</a:t>
+            </a:r>
+            <a:endParaRPr lang="ru-RU"/>
+          </a:p>
+        </p:txBody>
+      </p:sp>
+      <p:sp>
+        <p:nvSpPr>
+          <p:cNvPr id="4" name="Объект 3"/>
+          <p:cNvSpPr>
+            <a:spLocks noGrp="1"/>
+          </p:cNvSpPr>
+          <p:nvPr>
+            <p:ph sz="half" idx="2"/>
+          </p:nvPr>
+        </p:nvSpPr>
+        <p:spPr>
+          <a:xfrm>
+            <a:off x="6197600" y="1604964"/>
+            <a:ext cx="5384800" cy="3976687"/>
+          </a:xfrm>
+        </p:spPr>
+        <p:txBody>
+          <a:bodyPr/>
+          <a:lstStyle/>
+          <a:p>
+            <a:pPr lvl="0"/>
+            <a:r>
+              <a:rPr lang="en-US"/>
+              <a:t>Edit Master text styles</a:t>
+            </a:r>
+          </a:p>
+          <a:p>
+            <a:pPr lvl="1"/>
+            <a:r>
+              <a:rPr lang="en-US"/>
+              <a:t>Second level</a:t>
+            </a:r>
+          </a:p>
+          <a:p>
+            <a:pPr lvl="2"/>
+            <a:r>
+              <a:rPr lang="en-US"/>
+              <a:t>Third level</a:t>
+            </a:r>
+          </a:p>
+          <a:p>
+            <a:pPr lvl="3"/>
+            <a:r>
+              <a:rPr lang="en-US"/>
+              <a:t>Fourth level</a:t>
+            </a:r>
+          </a:p>
+          <a:p>
+            <a:pPr lvl="4"/>
+            <a:r>
+              <a:rPr lang="en-US"/>
+              <a:t>Fifth level</a:t>
+            </a:r>
+            <a:endParaRPr lang="ru-RU"/>
+          </a:p>
+        </p:txBody>
+      </p:sp>
+    </p:spTree>
+    <p:extLst>
+      <p:ext uri="{BB962C8B-B14F-4D97-AF65-F5344CB8AC3E}">
+        <p14:creationId xmlns:p14="http://schemas.microsoft.com/office/powerpoint/2010/main" val="13129778"/>
       </p:ext>
     </p:extLst>
   </p:cSld>
@@ -5309,7 +5113,7 @@
           <p:nvPr/>
         </p:nvPicPr>
         <p:blipFill>
-          <a:blip r:embed="rId8" cstate="print">
+          <a:blip r:embed="rId7" cstate="print">
             <a:extLst>
               <a:ext uri="{28A0092B-C50C-407E-A947-70E740481C1C}">
                 <a14:useLocalDpi xmlns:a14="http://schemas.microsoft.com/office/drawing/2010/main" val="0"/>
@@ -5342,9 +5146,8 @@
     <p:sldLayoutId id="2147483661" r:id="rId1"/>
     <p:sldLayoutId id="2147483662" r:id="rId2"/>
     <p:sldLayoutId id="2147483663" r:id="rId3"/>
-    <p:sldLayoutId id="2147483664" r:id="rId4"/>
-    <p:sldLayoutId id="2147483691" r:id="rId5"/>
-    <p:sldLayoutId id="2147483692" r:id="rId6"/>
+    <p:sldLayoutId id="2147483691" r:id="rId4"/>
+    <p:sldLayoutId id="2147483692" r:id="rId5"/>
   </p:sldLayoutIdLst>
   <p:txStyles>
     <p:titleStyle>
@@ -7598,16 +7401,12 @@
               <a:t>Разделяя код на отдельные составляющие</a:t>
             </a:r>
             <a:r>
-              <a:rPr lang="en-US"/>
+              <a:rPr lang="en-US" dirty="0"/>
               <a:t>,</a:t>
             </a:r>
             <a:r>
-              <a:rPr lang="ru-RU"/>
-              <a:t> </a:t>
-            </a:r>
-            <a:r>
               <a:rPr lang="ru-RU" dirty="0"/>
-              <a:t>позволяет разрабатывать бизнес-логику и </a:t>
+              <a:t> позволяет разрабатывать бизнес-логику и </a:t>
             </a:r>
             <a:r>
               <a:rPr lang="en-US" dirty="0"/>
@@ -7757,6 +7556,142 @@
 </p:sld>
 </file>
 
+<file path=ppt/slides/slide12.xml><?xml version="1.0" encoding="utf-8"?>
+<p:sld xmlns:a="http://schemas.openxmlformats.org/drawingml/2006/main" xmlns:r="http://schemas.openxmlformats.org/officeDocument/2006/relationships" xmlns:p="http://schemas.openxmlformats.org/presentationml/2006/main">
+  <p:cSld>
+    <p:spTree>
+      <p:nvGrpSpPr>
+        <p:cNvPr id="1" name=""/>
+        <p:cNvGrpSpPr/>
+        <p:nvPr/>
+      </p:nvGrpSpPr>
+      <p:grpSpPr>
+        <a:xfrm>
+          <a:off x="0" y="0"/>
+          <a:ext cx="0" cy="0"/>
+          <a:chOff x="0" y="0"/>
+          <a:chExt cx="0" cy="0"/>
+        </a:xfrm>
+      </p:grpSpPr>
+      <p:sp>
+        <p:nvSpPr>
+          <p:cNvPr id="2" name="Title 1">
+            <a:extLst>
+              <a:ext uri="{FF2B5EF4-FFF2-40B4-BE49-F238E27FC236}">
+                <a16:creationId xmlns:a16="http://schemas.microsoft.com/office/drawing/2014/main" id="{DD144102-7E32-40F1-A09A-43BFF4A3741A}"/>
+              </a:ext>
+            </a:extLst>
+          </p:cNvPr>
+          <p:cNvSpPr>
+            <a:spLocks noGrp="1"/>
+          </p:cNvSpPr>
+          <p:nvPr>
+            <p:ph type="title" idx="4294967295"/>
+          </p:nvPr>
+        </p:nvSpPr>
+        <p:spPr>
+          <a:xfrm>
+            <a:off x="476251" y="273050"/>
+            <a:ext cx="10970683" cy="923764"/>
+          </a:xfrm>
+        </p:spPr>
+        <p:txBody>
+          <a:bodyPr/>
+          <a:lstStyle/>
+          <a:p>
+            <a:r>
+              <a:rPr lang="ru-RU" dirty="0"/>
+              <a:t>Пример</a:t>
+            </a:r>
+            <a:endParaRPr lang="en-US" dirty="0"/>
+          </a:p>
+        </p:txBody>
+      </p:sp>
+    </p:spTree>
+    <p:extLst>
+      <p:ext uri="{BB962C8B-B14F-4D97-AF65-F5344CB8AC3E}">
+        <p14:creationId xmlns:p14="http://schemas.microsoft.com/office/powerpoint/2010/main" val="960205906"/>
+      </p:ext>
+    </p:extLst>
+  </p:cSld>
+  <p:clrMapOvr>
+    <a:masterClrMapping/>
+  </p:clrMapOvr>
+</p:sld>
+</file>
+
+<file path=ppt/slides/slide13.xml><?xml version="1.0" encoding="utf-8"?>
+<p:sld xmlns:a="http://schemas.openxmlformats.org/drawingml/2006/main" xmlns:r="http://schemas.openxmlformats.org/officeDocument/2006/relationships" xmlns:p="http://schemas.openxmlformats.org/presentationml/2006/main">
+  <p:cSld>
+    <p:spTree>
+      <p:nvGrpSpPr>
+        <p:cNvPr id="1" name=""/>
+        <p:cNvGrpSpPr/>
+        <p:nvPr/>
+      </p:nvGrpSpPr>
+      <p:grpSpPr>
+        <a:xfrm>
+          <a:off x="0" y="0"/>
+          <a:ext cx="0" cy="0"/>
+          <a:chOff x="0" y="0"/>
+          <a:chExt cx="0" cy="0"/>
+        </a:xfrm>
+      </p:grpSpPr>
+      <p:sp>
+        <p:nvSpPr>
+          <p:cNvPr id="2" name="Title 1">
+            <a:extLst>
+              <a:ext uri="{FF2B5EF4-FFF2-40B4-BE49-F238E27FC236}">
+                <a16:creationId xmlns:a16="http://schemas.microsoft.com/office/drawing/2014/main" id="{DD144102-7E32-40F1-A09A-43BFF4A3741A}"/>
+              </a:ext>
+            </a:extLst>
+          </p:cNvPr>
+          <p:cNvSpPr>
+            <a:spLocks noGrp="1"/>
+          </p:cNvSpPr>
+          <p:nvPr>
+            <p:ph type="title" idx="4294967295"/>
+          </p:nvPr>
+        </p:nvSpPr>
+        <p:spPr>
+          <a:xfrm>
+            <a:off x="476251" y="273050"/>
+            <a:ext cx="10970683" cy="923764"/>
+          </a:xfrm>
+        </p:spPr>
+        <p:txBody>
+          <a:bodyPr/>
+          <a:lstStyle/>
+          <a:p>
+            <a:r>
+              <a:rPr lang="ru-RU" dirty="0"/>
+              <a:t>Как убедится что </a:t>
+            </a:r>
+            <a:r>
+              <a:rPr lang="en-US" dirty="0"/>
+              <a:t>MVC </a:t>
+            </a:r>
+            <a:r>
+              <a:rPr lang="ru-RU" dirty="0"/>
+              <a:t>реализован верно?</a:t>
+            </a:r>
+            <a:endParaRPr lang="en-US" dirty="0"/>
+          </a:p>
+        </p:txBody>
+      </p:sp>
+    </p:spTree>
+    <p:extLst>
+      <p:ext uri="{BB962C8B-B14F-4D97-AF65-F5344CB8AC3E}">
+        <p14:creationId xmlns:p14="http://schemas.microsoft.com/office/powerpoint/2010/main" val="794208253"/>
+      </p:ext>
+    </p:extLst>
+  </p:cSld>
+  <p:clrMapOvr>
+    <a:masterClrMapping/>
+  </p:clrMapOvr>
+</p:sld>
+</file>
+
 <file path=ppt/slides/slide2.xml><?xml version="1.0" encoding="utf-8"?>
 <p:sld xmlns:a="http://schemas.openxmlformats.org/drawingml/2006/main" xmlns:r="http://schemas.openxmlformats.org/officeDocument/2006/relationships" xmlns:p="http://schemas.openxmlformats.org/presentationml/2006/main">
   <p:cSld>
@@ -7797,7 +7732,7 @@
           <a:p>
             <a:r>
               <a:rPr lang="ru-RU" dirty="0"/>
-              <a:t>Что такое ООП?</a:t>
+              <a:t>Что означает ООП?</a:t>
             </a:r>
             <a:endParaRPr lang="en-US" dirty="0"/>
           </a:p>
@@ -7897,7 +7832,7 @@
           <a:p>
             <a:r>
               <a:rPr lang="ru-RU" dirty="0"/>
-              <a:t>Что такое ООП?</a:t>
+              <a:t>Что означает ООП?</a:t>
             </a:r>
             <a:endParaRPr lang="en-US" dirty="0"/>
           </a:p>

</xml_diff>

<commit_message>
Change fonts for presentation
</commit_message>
<xml_diff>
--- a/Паттерн MVC.pptx
+++ b/Паттерн MVC.pptx
@@ -7310,7 +7310,7 @@
           <a:lstStyle/>
           <a:p>
             <a:r>
-              <a:rPr lang="en-US" dirty="0"/>
+              <a:rPr lang="en-US" sz="8800" dirty="0"/>
               <a:t>MVC</a:t>
             </a:r>
           </a:p>
@@ -7338,10 +7338,10 @@
           <a:lstStyle/>
           <a:p>
             <a:r>
-              <a:rPr lang="ru-RU" dirty="0"/>
+              <a:rPr lang="ru-RU" sz="4400" dirty="0"/>
               <a:t>Проектирование интерфейсов</a:t>
             </a:r>
-            <a:endParaRPr lang="en-US" dirty="0"/>
+            <a:endParaRPr lang="en-US" sz="4400" dirty="0"/>
           </a:p>
         </p:txBody>
       </p:sp>
@@ -7397,26 +7397,26 @@
           <a:lstStyle/>
           <a:p>
             <a:r>
-              <a:rPr lang="ru-RU" dirty="0"/>
+              <a:rPr lang="ru-RU" sz="2400" dirty="0"/>
               <a:t>Разделяя код на отдельные составляющие</a:t>
             </a:r>
             <a:r>
-              <a:rPr lang="en-US" dirty="0"/>
+              <a:rPr lang="en-US" sz="2400" dirty="0"/>
               <a:t>,</a:t>
             </a:r>
             <a:r>
-              <a:rPr lang="ru-RU" dirty="0"/>
+              <a:rPr lang="ru-RU" sz="2400" dirty="0"/>
               <a:t> позволяет разрабатывать бизнес-логику и </a:t>
             </a:r>
             <a:r>
-              <a:rPr lang="en-US" dirty="0"/>
+              <a:rPr lang="en-US" sz="2400" dirty="0"/>
               <a:t>UI </a:t>
             </a:r>
             <a:r>
-              <a:rPr lang="ru-RU" dirty="0"/>
+              <a:rPr lang="ru-RU" sz="2400" dirty="0"/>
               <a:t>представление отдельно</a:t>
             </a:r>
-            <a:endParaRPr lang="en-US" dirty="0"/>
+            <a:endParaRPr lang="en-US" sz="2400" dirty="0"/>
           </a:p>
         </p:txBody>
       </p:sp>
@@ -7442,11 +7442,11 @@
           <a:lstStyle/>
           <a:p>
             <a:r>
-              <a:rPr lang="ru-RU" dirty="0"/>
+              <a:rPr lang="ru-RU" sz="4400" dirty="0"/>
               <a:t>Какие проблемы решает </a:t>
             </a:r>
             <a:r>
-              <a:rPr lang="en-US" dirty="0"/>
+              <a:rPr lang="en-US" sz="4400" dirty="0"/>
               <a:t>MVC?</a:t>
             </a:r>
           </a:p>
@@ -7504,10 +7504,10 @@
           <a:lstStyle/>
           <a:p>
             <a:r>
-              <a:rPr lang="ru-RU" dirty="0"/>
+              <a:rPr lang="ru-RU" sz="2400" dirty="0"/>
               <a:t>Снижает связность кода, что облегает внесение изменений и новых фунциональностей </a:t>
             </a:r>
-            <a:endParaRPr lang="en-US" dirty="0"/>
+            <a:endParaRPr lang="en-US" sz="2400" dirty="0"/>
           </a:p>
         </p:txBody>
       </p:sp>
@@ -7533,11 +7533,11 @@
           <a:lstStyle/>
           <a:p>
             <a:r>
-              <a:rPr lang="ru-RU" dirty="0"/>
+              <a:rPr lang="ru-RU" sz="4400" dirty="0"/>
               <a:t>Какие проблемы решает </a:t>
             </a:r>
             <a:r>
-              <a:rPr lang="en-US" dirty="0"/>
+              <a:rPr lang="en-US" sz="4400" dirty="0"/>
               <a:t>MVC?</a:t>
             </a:r>
           </a:p>
@@ -7600,10 +7600,10 @@
           <a:lstStyle/>
           <a:p>
             <a:r>
-              <a:rPr lang="ru-RU" dirty="0"/>
+              <a:rPr lang="ru-RU" sz="4400" dirty="0"/>
               <a:t>Пример</a:t>
             </a:r>
-            <a:endParaRPr lang="en-US" dirty="0"/>
+            <a:endParaRPr lang="en-US" sz="4400" dirty="0"/>
           </a:p>
         </p:txBody>
       </p:sp>
@@ -7664,18 +7664,24 @@
           <a:lstStyle/>
           <a:p>
             <a:r>
-              <a:rPr lang="ru-RU" dirty="0"/>
+              <a:rPr lang="ru-RU" sz="4400" dirty="0"/>
               <a:t>Как убедится что </a:t>
             </a:r>
             <a:r>
-              <a:rPr lang="en-US" dirty="0"/>
+              <a:rPr lang="en-US" sz="4400" dirty="0"/>
               <a:t>MVC </a:t>
             </a:r>
-            <a:r>
-              <a:rPr lang="ru-RU" dirty="0"/>
-              <a:t>реализован верно?</a:t>
-            </a:r>
-            <a:endParaRPr lang="en-US" dirty="0"/>
+            <a:br>
+              <a:rPr lang="en-US" sz="4400" dirty="0"/>
+            </a:br>
+            <a:r>
+              <a:rPr lang="ru-RU" sz="4400" dirty="0"/>
+              <a:t>реализован верно</a:t>
+            </a:r>
+            <a:r>
+              <a:rPr lang="en-US" sz="4400" dirty="0"/>
+              <a:t>?</a:t>
+            </a:r>
           </a:p>
         </p:txBody>
       </p:sp>
@@ -7731,10 +7737,10 @@
           <a:lstStyle/>
           <a:p>
             <a:r>
-              <a:rPr lang="ru-RU" dirty="0"/>
+              <a:rPr lang="ru-RU" sz="4400" dirty="0"/>
               <a:t>Что означает ООП?</a:t>
             </a:r>
-            <a:endParaRPr lang="en-US" dirty="0"/>
+            <a:endParaRPr lang="en-US" sz="4400" dirty="0"/>
           </a:p>
         </p:txBody>
       </p:sp>
@@ -7790,22 +7796,22 @@
           <a:lstStyle/>
           <a:p>
             <a:r>
-              <a:rPr lang="ru-RU" dirty="0"/>
+              <a:rPr lang="ru-RU" sz="2400" dirty="0"/>
               <a:t>Наследование</a:t>
             </a:r>
           </a:p>
           <a:p>
             <a:r>
-              <a:rPr lang="ru-RU" dirty="0"/>
+              <a:rPr lang="ru-RU" sz="2400" dirty="0"/>
               <a:t>Инкапсуляция</a:t>
             </a:r>
           </a:p>
           <a:p>
             <a:r>
-              <a:rPr lang="ru-RU" dirty="0"/>
+              <a:rPr lang="ru-RU" sz="2400" dirty="0"/>
               <a:t>Полиморфизм</a:t>
             </a:r>
-            <a:endParaRPr lang="en-US" dirty="0"/>
+            <a:endParaRPr lang="en-US" sz="2400" dirty="0"/>
           </a:p>
         </p:txBody>
       </p:sp>
@@ -7831,10 +7837,10 @@
           <a:lstStyle/>
           <a:p>
             <a:r>
-              <a:rPr lang="ru-RU" dirty="0"/>
+              <a:rPr lang="ru-RU" sz="4400" dirty="0"/>
               <a:t>Что означает ООП?</a:t>
             </a:r>
-            <a:endParaRPr lang="en-US" dirty="0"/>
+            <a:endParaRPr lang="en-US" sz="4400" dirty="0"/>
           </a:p>
         </p:txBody>
       </p:sp>
@@ -7890,10 +7896,10 @@
           <a:lstStyle/>
           <a:p>
             <a:r>
-              <a:rPr lang="ru-RU" dirty="0"/>
+              <a:rPr lang="ru-RU" sz="4400" dirty="0"/>
               <a:t>Зачем? Для чего?</a:t>
             </a:r>
-            <a:endParaRPr lang="en-US" dirty="0"/>
+            <a:endParaRPr lang="en-US" sz="4400" dirty="0"/>
           </a:p>
         </p:txBody>
       </p:sp>
@@ -7949,16 +7955,16 @@
           <a:lstStyle/>
           <a:p>
             <a:r>
-              <a:rPr lang="ru-RU" dirty="0"/>
+              <a:rPr lang="ru-RU" sz="2400" dirty="0"/>
               <a:t>Борьба со сложностью</a:t>
             </a:r>
           </a:p>
           <a:p>
             <a:r>
-              <a:rPr lang="ru-RU" dirty="0"/>
+              <a:rPr lang="ru-RU" sz="2400" dirty="0"/>
               <a:t>Ответ на будущие изменения</a:t>
             </a:r>
-            <a:endParaRPr lang="en-US" dirty="0"/>
+            <a:endParaRPr lang="en-US" sz="2400" dirty="0"/>
           </a:p>
         </p:txBody>
       </p:sp>
@@ -7984,10 +7990,10 @@
           <a:lstStyle/>
           <a:p>
             <a:r>
-              <a:rPr lang="ru-RU" dirty="0"/>
+              <a:rPr lang="ru-RU" sz="4400" dirty="0"/>
               <a:t>Зачем? Для чего?</a:t>
             </a:r>
-            <a:endParaRPr lang="en-US" dirty="0"/>
+            <a:endParaRPr lang="en-US" sz="4400" dirty="0"/>
           </a:p>
         </p:txBody>
       </p:sp>
@@ -8043,10 +8049,10 @@
           <a:lstStyle/>
           <a:p>
             <a:r>
-              <a:rPr lang="ru-RU" dirty="0"/>
+              <a:rPr lang="ru-RU" sz="4400" dirty="0"/>
               <a:t>Что такое паттерн?</a:t>
             </a:r>
-            <a:endParaRPr lang="en-US" dirty="0"/>
+            <a:endParaRPr lang="en-US" sz="4400" dirty="0"/>
           </a:p>
         </p:txBody>
       </p:sp>
@@ -8102,10 +8108,10 @@
           <a:lstStyle/>
           <a:p>
             <a:r>
-              <a:rPr lang="ru-RU" dirty="0"/>
+              <a:rPr lang="ru-RU" sz="2400" dirty="0"/>
               <a:t>Паттерн -  повторяемая архитектурная конструкция, представляющая собой решение проблемы проектирования в рамках некоторого часто возникающего контекста.</a:t>
             </a:r>
-            <a:endParaRPr lang="en-US" dirty="0"/>
+            <a:endParaRPr lang="en-US" sz="2400" dirty="0"/>
           </a:p>
         </p:txBody>
       </p:sp>
@@ -8131,10 +8137,10 @@
           <a:lstStyle/>
           <a:p>
             <a:r>
-              <a:rPr lang="ru-RU" dirty="0"/>
+              <a:rPr lang="ru-RU" sz="4400" dirty="0"/>
               <a:t>Что такое паттерн?</a:t>
             </a:r>
-            <a:endParaRPr lang="en-US" dirty="0"/>
+            <a:endParaRPr lang="en-US" sz="4400" dirty="0"/>
           </a:p>
         </p:txBody>
       </p:sp>
@@ -8190,11 +8196,11 @@
           <a:lstStyle/>
           <a:p>
             <a:r>
-              <a:rPr lang="ru-RU" dirty="0"/>
+              <a:rPr lang="ru-RU" sz="4400" dirty="0"/>
               <a:t>Паттерн </a:t>
             </a:r>
             <a:r>
-              <a:rPr lang="en-US" dirty="0"/>
+              <a:rPr lang="en-US" sz="4400" dirty="0"/>
               <a:t>MVC</a:t>
             </a:r>
           </a:p>
@@ -8681,11 +8687,11 @@
           <a:lstStyle/>
           <a:p>
             <a:r>
-              <a:rPr lang="ru-RU" dirty="0"/>
+              <a:rPr lang="ru-RU" sz="4400" dirty="0"/>
               <a:t>Какие проблемы решает </a:t>
             </a:r>
             <a:r>
-              <a:rPr lang="en-US" dirty="0"/>
+              <a:rPr lang="en-US" sz="4400" dirty="0"/>
               <a:t>MVC?</a:t>
             </a:r>
           </a:p>

</xml_diff>

<commit_message>
Refactoring events to appropriate pattern
</commit_message>
<xml_diff>
--- a/Паттерн MVC.pptx
+++ b/Паттерн MVC.pptx
@@ -1134,6 +1134,102 @@
 </p:notes>
 </file>
 
+<file path=ppt/notesSlides/notesSlide8.xml><?xml version="1.0" encoding="utf-8"?>
+<p:notes xmlns:a="http://schemas.openxmlformats.org/drawingml/2006/main" xmlns:r="http://schemas.openxmlformats.org/officeDocument/2006/relationships" xmlns:p="http://schemas.openxmlformats.org/presentationml/2006/main">
+  <p:cSld>
+    <p:spTree>
+      <p:nvGrpSpPr>
+        <p:cNvPr id="1" name=""/>
+        <p:cNvGrpSpPr/>
+        <p:nvPr/>
+      </p:nvGrpSpPr>
+      <p:grpSpPr>
+        <a:xfrm>
+          <a:off x="0" y="0"/>
+          <a:ext cx="0" cy="0"/>
+          <a:chOff x="0" y="0"/>
+          <a:chExt cx="0" cy="0"/>
+        </a:xfrm>
+      </p:grpSpPr>
+      <p:sp>
+        <p:nvSpPr>
+          <p:cNvPr id="2" name="Slide Image Placeholder 1"/>
+          <p:cNvSpPr>
+            <a:spLocks noGrp="1" noRot="1" noChangeAspect="1"/>
+          </p:cNvSpPr>
+          <p:nvPr>
+            <p:ph type="sldImg"/>
+          </p:nvPr>
+        </p:nvSpPr>
+        <p:spPr/>
+      </p:sp>
+      <p:sp>
+        <p:nvSpPr>
+          <p:cNvPr id="3" name="Notes Placeholder 2"/>
+          <p:cNvSpPr>
+            <a:spLocks noGrp="1"/>
+          </p:cNvSpPr>
+          <p:nvPr>
+            <p:ph type="body" idx="1"/>
+          </p:nvPr>
+        </p:nvSpPr>
+        <p:spPr/>
+        <p:txBody>
+          <a:bodyPr/>
+          <a:lstStyle/>
+          <a:p>
+            <a:r>
+              <a:rPr lang="ru-RU" dirty="0"/>
+              <a:t>Паттерн </a:t>
+            </a:r>
+            <a:r>
+              <a:rPr lang="en-US" dirty="0"/>
+              <a:t>MVC </a:t>
+            </a:r>
+            <a:r>
+              <a:rPr lang="ru-RU"/>
+              <a:t>подразумевает разделение программы на 3 части</a:t>
+            </a:r>
+            <a:endParaRPr lang="en-US"/>
+          </a:p>
+        </p:txBody>
+      </p:sp>
+      <p:sp>
+        <p:nvSpPr>
+          <p:cNvPr id="4" name="Slide Number Placeholder 3"/>
+          <p:cNvSpPr>
+            <a:spLocks noGrp="1"/>
+          </p:cNvSpPr>
+          <p:nvPr>
+            <p:ph type="sldNum" sz="quarter" idx="5"/>
+          </p:nvPr>
+        </p:nvSpPr>
+        <p:spPr/>
+        <p:txBody>
+          <a:bodyPr/>
+          <a:lstStyle/>
+          <a:p>
+            <a:fld id="{13EFAFE1-556C-4699-B5AC-21C248603E02}" type="slidenum">
+              <a:rPr lang="en-US" smtClean="0"/>
+              <a:t>12</a:t>
+            </a:fld>
+            <a:endParaRPr lang="en-US"/>
+          </a:p>
+        </p:txBody>
+      </p:sp>
+    </p:spTree>
+    <p:extLst>
+      <p:ext uri="{BB962C8B-B14F-4D97-AF65-F5344CB8AC3E}">
+        <p14:creationId xmlns:p14="http://schemas.microsoft.com/office/powerpoint/2010/main" val="4092314495"/>
+      </p:ext>
+    </p:extLst>
+  </p:cSld>
+  <p:clrMapOvr>
+    <a:masterClrMapping/>
+  </p:clrMapOvr>
+</p:notes>
+</file>
+
 <file path=ppt/slideLayouts/slideLayout1.xml><?xml version="1.0" encoding="utf-8"?>
 <p:sldLayout xmlns:a="http://schemas.openxmlformats.org/drawingml/2006/main" xmlns:r="http://schemas.openxmlformats.org/officeDocument/2006/relationships" xmlns:p="http://schemas.openxmlformats.org/presentationml/2006/main">
   <p:cSld name="Пользовательский макет">
@@ -2114,7 +2210,7 @@
           <a:p>
             <a:fld id="{98B268AD-4E81-4577-BD5E-7A237943881D}" type="datetimeFigureOut">
               <a:rPr lang="en-US" smtClean="0"/>
-              <a:t>2/18/2019</a:t>
+              <a:t>2/21/2019</a:t>
             </a:fld>
             <a:endParaRPr lang="en-US"/>
           </a:p>
@@ -2312,7 +2408,7 @@
           <a:p>
             <a:fld id="{98B268AD-4E81-4577-BD5E-7A237943881D}" type="datetimeFigureOut">
               <a:rPr lang="en-US" smtClean="0"/>
-              <a:t>2/18/2019</a:t>
+              <a:t>2/21/2019</a:t>
             </a:fld>
             <a:endParaRPr lang="en-US"/>
           </a:p>
@@ -2516,7 +2612,7 @@
           <a:p>
             <a:fld id="{C764DE79-268F-4C1A-8933-263129D2AF90}" type="datetimeFigureOut">
               <a:rPr lang="en-US" dirty="0"/>
-              <a:t>2/18/2019</a:t>
+              <a:t>2/21/2019</a:t>
             </a:fld>
             <a:endParaRPr lang="en-US" dirty="0"/>
           </a:p>
@@ -2686,7 +2782,7 @@
           <a:p>
             <a:fld id="{C764DE79-268F-4C1A-8933-263129D2AF90}" type="datetimeFigureOut">
               <a:rPr lang="en-US" dirty="0"/>
-              <a:t>2/18/2019</a:t>
+              <a:t>2/21/2019</a:t>
             </a:fld>
             <a:endParaRPr lang="en-US" dirty="0"/>
           </a:p>
@@ -2894,7 +2990,7 @@
           <a:p>
             <a:fld id="{98B268AD-4E81-4577-BD5E-7A237943881D}" type="datetimeFigureOut">
               <a:rPr lang="en-US" smtClean="0"/>
-              <a:t>2/18/2019</a:t>
+              <a:t>2/21/2019</a:t>
             </a:fld>
             <a:endParaRPr lang="en-US"/>
           </a:p>
@@ -3152,7 +3248,7 @@
           <a:p>
             <a:fld id="{C764DE79-268F-4C1A-8933-263129D2AF90}" type="datetimeFigureOut">
               <a:rPr lang="en-US" dirty="0"/>
-              <a:t>2/18/2019</a:t>
+              <a:t>2/21/2019</a:t>
             </a:fld>
             <a:endParaRPr lang="en-US" dirty="0"/>
           </a:p>
@@ -3384,7 +3480,7 @@
           <a:p>
             <a:fld id="{C764DE79-268F-4C1A-8933-263129D2AF90}" type="datetimeFigureOut">
               <a:rPr lang="en-US" dirty="0"/>
-              <a:t>2/18/2019</a:t>
+              <a:t>2/21/2019</a:t>
             </a:fld>
             <a:endParaRPr lang="en-US" dirty="0"/>
           </a:p>
@@ -3751,7 +3847,7 @@
           <a:p>
             <a:fld id="{C764DE79-268F-4C1A-8933-263129D2AF90}" type="datetimeFigureOut">
               <a:rPr lang="en-US" dirty="0"/>
-              <a:t>2/18/2019</a:t>
+              <a:t>2/21/2019</a:t>
             </a:fld>
             <a:endParaRPr lang="en-US" dirty="0"/>
           </a:p>
@@ -3869,7 +3965,7 @@
           <a:p>
             <a:fld id="{C764DE79-268F-4C1A-8933-263129D2AF90}" type="datetimeFigureOut">
               <a:rPr lang="en-US" dirty="0"/>
-              <a:t>2/18/2019</a:t>
+              <a:t>2/21/2019</a:t>
             </a:fld>
             <a:endParaRPr lang="en-US" dirty="0"/>
           </a:p>
@@ -3964,7 +4060,7 @@
           <a:p>
             <a:fld id="{C764DE79-268F-4C1A-8933-263129D2AF90}" type="datetimeFigureOut">
               <a:rPr lang="en-US" dirty="0"/>
-              <a:t>2/18/2019</a:t>
+              <a:t>2/21/2019</a:t>
             </a:fld>
             <a:endParaRPr lang="en-US" dirty="0"/>
           </a:p>
@@ -4241,7 +4337,7 @@
           <a:p>
             <a:fld id="{C764DE79-268F-4C1A-8933-263129D2AF90}" type="datetimeFigureOut">
               <a:rPr lang="en-US" dirty="0"/>
-              <a:t>2/18/2019</a:t>
+              <a:t>2/21/2019</a:t>
             </a:fld>
             <a:endParaRPr lang="en-US" dirty="0"/>
           </a:p>
@@ -4498,7 +4594,7 @@
           <a:p>
             <a:fld id="{C764DE79-268F-4C1A-8933-263129D2AF90}" type="datetimeFigureOut">
               <a:rPr lang="en-US" dirty="0"/>
-              <a:t>2/18/2019</a:t>
+              <a:t>2/21/2019</a:t>
             </a:fld>
             <a:endParaRPr lang="en-US" dirty="0"/>
           </a:p>
@@ -4668,7 +4764,7 @@
           <a:p>
             <a:fld id="{C764DE79-268F-4C1A-8933-263129D2AF90}" type="datetimeFigureOut">
               <a:rPr lang="en-US" dirty="0"/>
-              <a:t>2/18/2019</a:t>
+              <a:t>2/21/2019</a:t>
             </a:fld>
             <a:endParaRPr lang="en-US" dirty="0"/>
           </a:p>
@@ -4848,7 +4944,7 @@
           <a:p>
             <a:fld id="{C764DE79-268F-4C1A-8933-263129D2AF90}" type="datetimeFigureOut">
               <a:rPr lang="en-US" dirty="0"/>
-              <a:t>2/18/2019</a:t>
+              <a:t>2/21/2019</a:t>
             </a:fld>
             <a:endParaRPr lang="en-US" dirty="0"/>
           </a:p>
@@ -5035,7 +5131,7 @@
           <a:p>
             <a:fld id="{98B268AD-4E81-4577-BD5E-7A237943881D}" type="datetimeFigureOut">
               <a:rPr lang="en-US" smtClean="0"/>
-              <a:t>2/18/2019</a:t>
+              <a:t>2/21/2019</a:t>
             </a:fld>
             <a:endParaRPr lang="en-US"/>
           </a:p>
@@ -7781,7 +7877,7 @@
           <a:p>
             <a:fld id="{C764DE79-268F-4C1A-8933-263129D2AF90}" type="datetimeFigureOut">
               <a:rPr lang="en-US" dirty="0"/>
-              <a:t>2/18/2019</a:t>
+              <a:t>2/21/2019</a:t>
             </a:fld>
             <a:endParaRPr lang="en-US" dirty="0"/>
           </a:p>

</xml_diff>